<commit_message>
Updated 1,2,3 linux arch
</commit_message>
<xml_diff>
--- a/LinuxArch/LinuxArch1.pptx
+++ b/LinuxArch/LinuxArch1.pptx
@@ -3790,7 +3790,7 @@
           <a:p>
             <a:r>
               <a:rPr lang="en-US" dirty="0"/>
-              <a:t>LFS</a:t>
+              <a:t>LFS - Linux From Scratch</a:t>
             </a:r>
           </a:p>
         </p:txBody>
@@ -3818,7 +3818,15 @@
           <a:p>
             <a:r>
               <a:rPr lang="en-US" dirty="0"/>
-              <a:t>Different distributions</a:t>
+              <a:t>Different distributions Distro=</a:t>
+            </a:r>
+            <a:r>
+              <a:rPr lang="en-US" dirty="0" err="1"/>
+              <a:t>Linux+GNU+Additional</a:t>
+            </a:r>
+            <a:r>
+              <a:rPr lang="en-US" dirty="0"/>
+              <a:t> Programs</a:t>
             </a:r>
           </a:p>
         </p:txBody>
@@ -3906,7 +3914,7 @@
           <a:p>
             <a:r>
               <a:rPr lang="en-US" dirty="0"/>
-              <a:t>GNU</a:t>
+              <a:t>GNU – GNU is not UNIX</a:t>
             </a:r>
           </a:p>
         </p:txBody>
@@ -3926,7 +3934,7 @@
         <p:spPr>
           <a:xfrm>
             <a:off x="492368" y="1646389"/>
-            <a:ext cx="10328031" cy="923330"/>
+            <a:ext cx="10328031" cy="2862322"/>
           </a:xfrm>
           <a:prstGeom prst="rect">
             <a:avLst/>
@@ -3942,6 +3950,74 @@
             <a:r>
               <a:rPr lang="en-GB" dirty="0"/>
               <a:t>GNU - is an extensive collection of free software, which can be used as an operating system or can be used in parts with other operating systems. The use of the completed GNU tools led to the family of operating systems popularly known as Linux.</a:t>
+            </a:r>
+          </a:p>
+          <a:p>
+            <a:endParaRPr lang="en-GB" dirty="0"/>
+          </a:p>
+          <a:p>
+            <a:endParaRPr lang="en-GB" dirty="0"/>
+          </a:p>
+          <a:p>
+            <a:r>
+              <a:rPr lang="en-GB" dirty="0"/>
+              <a:t>FreeBSD </a:t>
+            </a:r>
+            <a:r>
+              <a:rPr lang="en-GB" dirty="0" err="1"/>
+              <a:t>uniq</a:t>
+            </a:r>
+            <a:r>
+              <a:rPr lang="en-GB" dirty="0"/>
+              <a:t> – BSD</a:t>
+            </a:r>
+            <a:br>
+              <a:rPr lang="en-GB" dirty="0"/>
+            </a:br>
+            <a:r>
+              <a:rPr lang="en-GB" dirty="0"/>
+              <a:t>Linux </a:t>
+            </a:r>
+            <a:r>
+              <a:rPr lang="en-GB" dirty="0" err="1"/>
+              <a:t>uniq</a:t>
+            </a:r>
+            <a:r>
+              <a:rPr lang="en-GB" dirty="0"/>
+              <a:t> – GNU</a:t>
+            </a:r>
+            <a:br>
+              <a:rPr lang="en-GB" dirty="0"/>
+            </a:br>
+            <a:r>
+              <a:rPr lang="en-GB" dirty="0"/>
+              <a:t>FreeBSD </a:t>
+            </a:r>
+            <a:r>
+              <a:rPr lang="en-GB" dirty="0" err="1"/>
+              <a:t>guniq</a:t>
+            </a:r>
+            <a:r>
+              <a:rPr lang="en-GB" dirty="0"/>
+              <a:t> – GNU</a:t>
+            </a:r>
+            <a:br>
+              <a:rPr lang="en-GB" dirty="0"/>
+            </a:br>
+            <a:br>
+              <a:rPr lang="en-GB" dirty="0"/>
+            </a:br>
+            <a:r>
+              <a:rPr lang="en-GB" dirty="0"/>
+              <a:t>Linux == GNU/Linux == GNU </a:t>
+            </a:r>
+            <a:r>
+              <a:rPr lang="en-GB" dirty="0" err="1"/>
+              <a:t>utils</a:t>
+            </a:r>
+            <a:r>
+              <a:rPr lang="en-GB" dirty="0"/>
+              <a:t> + Linux kernel</a:t>
             </a:r>
             <a:endParaRPr lang="en-RU" dirty="0"/>
           </a:p>
@@ -5359,7 +5435,7 @@
         </p:spPr>
         <p:txBody>
           <a:bodyPr>
-            <a:normAutofit lnSpcReduction="10000"/>
+            <a:normAutofit fontScale="92500" lnSpcReduction="10000"/>
           </a:bodyPr>
           <a:lstStyle/>
           <a:p>
@@ -5391,6 +5467,26 @@
               <a:rPr lang="en-US" dirty="0"/>
               <a:t>OpenBSD 1995 (clean and secure)</a:t>
             </a:r>
+            <a:endParaRPr lang="ru-RU" dirty="0"/>
+          </a:p>
+          <a:p>
+            <a:r>
+              <a:rPr lang="en-US" dirty="0"/>
+              <a:t>OpenSSH, </a:t>
+            </a:r>
+            <a:r>
+              <a:rPr lang="en-US" dirty="0" err="1"/>
+              <a:t>OpenBGPD</a:t>
+            </a:r>
+            <a:r>
+              <a:rPr lang="en-US" dirty="0"/>
+              <a:t>, </a:t>
+            </a:r>
+            <a:r>
+              <a:rPr lang="en-US" dirty="0" err="1"/>
+              <a:t>ssl</a:t>
+            </a:r>
+            <a:endParaRPr lang="en-US" dirty="0"/>
           </a:p>
           <a:p>
             <a:endParaRPr lang="en-US" dirty="0"/>
@@ -5486,7 +5582,7 @@
         <p:spPr>
           <a:xfrm>
             <a:off x="4994030" y="1065850"/>
-            <a:ext cx="5859585" cy="3515751"/>
+            <a:ext cx="6642753" cy="3985652"/>
           </a:xfrm>
           <a:prstGeom prst="rect">
             <a:avLst/>
@@ -6066,6 +6162,45 @@
             <a:r>
               <a:rPr lang="en-US" dirty="0"/>
               <a:t>Linux versions history</a:t>
+            </a:r>
+          </a:p>
+        </p:txBody>
+      </p:sp>
+      <p:sp>
+        <p:nvSpPr>
+          <p:cNvPr id="2" name="TextBox 1">
+            <a:extLst>
+              <a:ext uri="{FF2B5EF4-FFF2-40B4-BE49-F238E27FC236}">
+                <a16:creationId xmlns:a16="http://schemas.microsoft.com/office/drawing/2014/main" id="{A7F97F81-F05F-C14C-9055-C6C3D0A24F20}"/>
+              </a:ext>
+            </a:extLst>
+          </p:cNvPr>
+          <p:cNvSpPr txBox="1"/>
+          <p:nvPr/>
+        </p:nvSpPr>
+        <p:spPr>
+          <a:xfrm>
+            <a:off x="2832410" y="1538868"/>
+            <a:ext cx="1042273" cy="369332"/>
+          </a:xfrm>
+          <a:prstGeom prst="rect">
+            <a:avLst/>
+          </a:prstGeom>
+          <a:noFill/>
+        </p:spPr>
+        <p:txBody>
+          <a:bodyPr wrap="none" rtlCol="0">
+            <a:spAutoFit/>
+          </a:bodyPr>
+          <a:lstStyle/>
+          <a:p>
+            <a:r>
+              <a:rPr lang="en-GB" dirty="0"/>
+              <a:t>u</a:t>
+            </a:r>
+            <a:r>
+              <a:rPr lang="en-RU" dirty="0"/>
+              <a:t>name -r</a:t>
             </a:r>
           </a:p>
         </p:txBody>

</xml_diff>